<commit_message>
Add Rstudio project structure and update files a bit
</commit_message>
<xml_diff>
--- a/day1/lecture1_intro.pptx
+++ b/day1/lecture1_intro.pptx
@@ -231,7 +231,7 @@
           <a:p>
             <a:fld id="{0377424B-A23C-43FF-8673-376C6E767ED7}" type="datetimeFigureOut">
               <a:rPr lang="en-US" smtClean="0"/>
-              <a:t>1/13/2018</a:t>
+              <a:t>1/14/2018</a:t>
             </a:fld>
             <a:endParaRPr lang="en-US"/>
           </a:p>
@@ -580,7 +580,7 @@
           </a:ln>
           <a:extLst>
             <a:ext uri="{909E8E84-426E-40dd-AFC4-6F175D3DCCD1}">
-              <a14:hiddenFill xmlns:a14="http://schemas.microsoft.com/office/drawing/2010/main" xmlns="">
+              <a14:hiddenFill xmlns="" xmlns:a14="http://schemas.microsoft.com/office/drawing/2010/main">
                 <a:solidFill>
                   <a:srgbClr val="FFFFFF"/>
                 </a:solidFill>
@@ -623,7 +623,7 @@
           </a:ln>
           <a:extLst>
             <a:ext uri="{909E8E84-426E-40dd-AFC4-6F175D3DCCD1}">
-              <a14:hiddenFill xmlns:a14="http://schemas.microsoft.com/office/drawing/2010/main" xmlns="">
+              <a14:hiddenFill xmlns="" xmlns:a14="http://schemas.microsoft.com/office/drawing/2010/main">
                 <a:noFill/>
               </a14:hiddenFill>
             </a:ext>
@@ -722,7 +722,7 @@
           <a:p>
             <a:fld id="{BA23EE8D-9CE0-4F42-A40F-E28604EA7175}" type="datetime1">
               <a:rPr lang="en-US" smtClean="0"/>
-              <a:t>1/13/2018</a:t>
+              <a:t>1/14/2018</a:t>
             </a:fld>
             <a:endParaRPr lang="en-US"/>
           </a:p>
@@ -909,7 +909,7 @@
           <a:p>
             <a:fld id="{C602C5EE-1F52-440A-B21D-CF34717184B1}" type="datetime1">
               <a:rPr lang="en-US" smtClean="0"/>
-              <a:t>1/13/2018</a:t>
+              <a:t>1/14/2018</a:t>
             </a:fld>
             <a:endParaRPr lang="en-US"/>
           </a:p>
@@ -1105,7 +1105,7 @@
           <a:p>
             <a:fld id="{88EA7AC3-3927-460F-BC0A-B8263F635273}" type="datetime1">
               <a:rPr lang="en-US" smtClean="0"/>
-              <a:t>1/13/2018</a:t>
+              <a:t>1/14/2018</a:t>
             </a:fld>
             <a:endParaRPr lang="en-US"/>
           </a:p>
@@ -1357,7 +1357,7 @@
           <a:p>
             <a:fld id="{F134B72F-0B71-4FD2-BD20-28F3E78BBA16}" type="datetime1">
               <a:rPr lang="en-US" smtClean="0"/>
-              <a:t>1/13/2018</a:t>
+              <a:t>1/14/2018</a:t>
             </a:fld>
             <a:endParaRPr lang="en-US"/>
           </a:p>
@@ -1581,7 +1581,7 @@
           <a:p>
             <a:fld id="{E47B1B4E-0EC6-4546-B26A-C4455998E44E}" type="datetime1">
               <a:rPr lang="en-US" smtClean="0"/>
-              <a:t>1/13/2018</a:t>
+              <a:t>1/14/2018</a:t>
             </a:fld>
             <a:endParaRPr lang="en-US"/>
           </a:p>
@@ -1889,7 +1889,7 @@
           <a:p>
             <a:fld id="{C3A8C74C-0B69-4161-99E9-DF9818443EAA}" type="datetime1">
               <a:rPr lang="en-US" smtClean="0"/>
-              <a:t>1/13/2018</a:t>
+              <a:t>1/14/2018</a:t>
             </a:fld>
             <a:endParaRPr lang="en-US"/>
           </a:p>
@@ -2057,7 +2057,7 @@
           <a:p>
             <a:fld id="{4DFBF3A0-C444-4F34-BF5B-169E9D461035}" type="datetime1">
               <a:rPr lang="en-US" smtClean="0"/>
-              <a:t>1/13/2018</a:t>
+              <a:t>1/14/2018</a:t>
             </a:fld>
             <a:endParaRPr lang="en-US"/>
           </a:p>
@@ -2369,7 +2369,7 @@
           <a:p>
             <a:fld id="{E196B420-BADE-4187-9E75-E64276466004}" type="datetime1">
               <a:rPr lang="en-US" smtClean="0"/>
-              <a:t>1/13/2018</a:t>
+              <a:t>1/14/2018</a:t>
             </a:fld>
             <a:endParaRPr lang="en-US"/>
           </a:p>
@@ -2681,7 +2681,7 @@
           <a:p>
             <a:fld id="{FF00C915-A483-44DD-9703-2D268BDAA475}" type="datetime1">
               <a:rPr lang="en-US" smtClean="0"/>
-              <a:t>1/13/2018</a:t>
+              <a:t>1/14/2018</a:t>
             </a:fld>
             <a:endParaRPr lang="en-US"/>
           </a:p>
@@ -2901,7 +2901,7 @@
           <a:p>
             <a:fld id="{BA23EE8D-9CE0-4F42-A40F-E28604EA7175}" type="datetime1">
               <a:rPr lang="en-US" smtClean="0"/>
-              <a:t>1/13/2018</a:t>
+              <a:t>1/14/2018</a:t>
             </a:fld>
             <a:endParaRPr lang="en-US"/>
           </a:p>
@@ -3099,7 +3099,7 @@
           <a:p>
             <a:fld id="{1A4DAFB5-4EEC-49BD-AB33-559CD6F558E3}" type="datetime1">
               <a:rPr lang="en-US" smtClean="0"/>
-              <a:t>1/13/2018</a:t>
+              <a:t>1/14/2018</a:t>
             </a:fld>
             <a:endParaRPr lang="en-US"/>
           </a:p>
@@ -3285,7 +3285,7 @@
           <a:p>
             <a:fld id="{1A4DAFB5-4EEC-49BD-AB33-559CD6F558E3}" type="datetime1">
               <a:rPr lang="en-US" smtClean="0"/>
-              <a:t>1/13/2018</a:t>
+              <a:t>1/14/2018</a:t>
             </a:fld>
             <a:endParaRPr lang="en-US"/>
           </a:p>
@@ -3560,7 +3560,7 @@
           <a:p>
             <a:fld id="{1EE2056D-DC17-4607-87F9-EA4937BD48E2}" type="datetime1">
               <a:rPr lang="en-US" smtClean="0"/>
-              <a:t>1/13/2018</a:t>
+              <a:t>1/14/2018</a:t>
             </a:fld>
             <a:endParaRPr lang="en-US"/>
           </a:p>
@@ -3825,7 +3825,7 @@
           <a:p>
             <a:fld id="{866E3DAD-9254-43DE-A1F3-F1D56B1E5B5F}" type="datetime1">
               <a:rPr lang="en-US" smtClean="0"/>
-              <a:t>1/13/2018</a:t>
+              <a:t>1/14/2018</a:t>
             </a:fld>
             <a:endParaRPr lang="en-US"/>
           </a:p>
@@ -4237,7 +4237,7 @@
           <a:p>
             <a:fld id="{12F88D45-78A7-46A0-99B7-2046E351D366}" type="datetime1">
               <a:rPr lang="en-US" smtClean="0"/>
-              <a:t>1/13/2018</a:t>
+              <a:t>1/14/2018</a:t>
             </a:fld>
             <a:endParaRPr lang="en-US"/>
           </a:p>
@@ -4378,7 +4378,7 @@
           <a:p>
             <a:fld id="{7716AC84-6778-466F-95F9-3EEE8E306ABF}" type="datetime1">
               <a:rPr lang="en-US" smtClean="0"/>
-              <a:t>1/13/2018</a:t>
+              <a:t>1/14/2018</a:t>
             </a:fld>
             <a:endParaRPr lang="en-US"/>
           </a:p>
@@ -4491,7 +4491,7 @@
           <a:p>
             <a:fld id="{02DEDAFE-CBEF-41E8-868F-E40C867A5636}" type="datetime1">
               <a:rPr lang="en-US" smtClean="0"/>
-              <a:t>1/13/2018</a:t>
+              <a:t>1/14/2018</a:t>
             </a:fld>
             <a:endParaRPr lang="en-US"/>
           </a:p>
@@ -4802,7 +4802,7 @@
           <a:p>
             <a:fld id="{20C87E4D-F358-4436-A283-114607D95274}" type="datetime1">
               <a:rPr lang="en-US" smtClean="0"/>
-              <a:t>1/13/2018</a:t>
+              <a:t>1/14/2018</a:t>
             </a:fld>
             <a:endParaRPr lang="en-US"/>
           </a:p>
@@ -5090,7 +5090,7 @@
           <a:p>
             <a:fld id="{6CCABA82-8A7B-4924-987B-0B7221667B17}" type="datetime1">
               <a:rPr lang="en-US" smtClean="0"/>
-              <a:t>1/13/2018</a:t>
+              <a:t>1/14/2018</a:t>
             </a:fld>
             <a:endParaRPr lang="en-US"/>
           </a:p>
@@ -5288,7 +5288,7 @@
           <a:p>
             <a:fld id="{C602C5EE-1F52-440A-B21D-CF34717184B1}" type="datetime1">
               <a:rPr lang="en-US" smtClean="0"/>
-              <a:t>1/13/2018</a:t>
+              <a:t>1/14/2018</a:t>
             </a:fld>
             <a:endParaRPr lang="en-US"/>
           </a:p>
@@ -5496,7 +5496,7 @@
           <a:p>
             <a:fld id="{88EA7AC3-3927-460F-BC0A-B8263F635273}" type="datetime1">
               <a:rPr lang="en-US" smtClean="0"/>
-              <a:t>1/13/2018</a:t>
+              <a:t>1/14/2018</a:t>
             </a:fld>
             <a:endParaRPr lang="en-US"/>
           </a:p>
@@ -5705,7 +5705,7 @@
           <a:p>
             <a:fld id="{1EE2056D-DC17-4607-87F9-EA4937BD48E2}" type="datetime1">
               <a:rPr lang="en-US" smtClean="0"/>
-              <a:t>1/13/2018</a:t>
+              <a:t>1/14/2018</a:t>
             </a:fld>
             <a:endParaRPr lang="en-US"/>
           </a:p>
@@ -6008,7 +6008,7 @@
           <a:p>
             <a:fld id="{866E3DAD-9254-43DE-A1F3-F1D56B1E5B5F}" type="datetime1">
               <a:rPr lang="en-US" smtClean="0"/>
-              <a:t>1/13/2018</a:t>
+              <a:t>1/14/2018</a:t>
             </a:fld>
             <a:endParaRPr lang="en-US"/>
           </a:p>
@@ -6450,7 +6450,7 @@
           <a:p>
             <a:fld id="{12F88D45-78A7-46A0-99B7-2046E351D366}" type="datetime1">
               <a:rPr lang="en-US" smtClean="0"/>
-              <a:t>1/13/2018</a:t>
+              <a:t>1/14/2018</a:t>
             </a:fld>
             <a:endParaRPr lang="en-US"/>
           </a:p>
@@ -6585,7 +6585,7 @@
           <a:p>
             <a:fld id="{7716AC84-6778-466F-95F9-3EEE8E306ABF}" type="datetime1">
               <a:rPr lang="en-US" smtClean="0"/>
-              <a:t>1/13/2018</a:t>
+              <a:t>1/14/2018</a:t>
             </a:fld>
             <a:endParaRPr lang="en-US"/>
           </a:p>
@@ -6698,7 +6698,7 @@
           <a:p>
             <a:fld id="{02DEDAFE-CBEF-41E8-868F-E40C867A5636}" type="datetime1">
               <a:rPr lang="en-US" smtClean="0"/>
-              <a:t>1/13/2018</a:t>
+              <a:t>1/14/2018</a:t>
             </a:fld>
             <a:endParaRPr lang="en-US"/>
           </a:p>
@@ -6991,7 +6991,7 @@
           <a:p>
             <a:fld id="{20C87E4D-F358-4436-A283-114607D95274}" type="datetime1">
               <a:rPr lang="en-US" smtClean="0"/>
-              <a:t>1/13/2018</a:t>
+              <a:t>1/14/2018</a:t>
             </a:fld>
             <a:endParaRPr lang="en-US"/>
           </a:p>
@@ -7265,7 +7265,7 @@
           <a:p>
             <a:fld id="{6CCABA82-8A7B-4924-987B-0B7221667B17}" type="datetime1">
               <a:rPr lang="en-US" smtClean="0"/>
-              <a:t>1/13/2018</a:t>
+              <a:t>1/14/2018</a:t>
             </a:fld>
             <a:endParaRPr lang="en-US"/>
           </a:p>
@@ -7387,17 +7387,17 @@
           </a:ln>
           <a:extLst>
             <a:ext uri="{FAA26D3D-D897-4be2-8F04-BA451C77F1D7}">
-              <ma14:placeholderFlag xmlns:ma14="http://schemas.microsoft.com/office/mac/drawingml/2011/main" xmlns="" val="1"/>
+              <ma14:placeholderFlag xmlns="" xmlns:ma14="http://schemas.microsoft.com/office/mac/drawingml/2011/main" val="1"/>
             </a:ext>
             <a:ext uri="{909E8E84-426E-40dd-AFC4-6F175D3DCCD1}">
-              <a14:hiddenFill xmlns:a14="http://schemas.microsoft.com/office/drawing/2010/main" xmlns="">
+              <a14:hiddenFill xmlns="" xmlns:a14="http://schemas.microsoft.com/office/drawing/2010/main">
                 <a:solidFill>
                   <a:srgbClr val="FFFFFF"/>
                 </a:solidFill>
               </a14:hiddenFill>
             </a:ext>
             <a:ext uri="{91240B29-F687-4f45-9708-019B960494DF}">
-              <a14:hiddenLine xmlns:a14="http://schemas.microsoft.com/office/drawing/2010/main" xmlns="" w="9525">
+              <a14:hiddenLine xmlns="" xmlns:a14="http://schemas.microsoft.com/office/drawing/2010/main" w="9525">
                 <a:solidFill>
                   <a:srgbClr val="000000"/>
                 </a:solidFill>
@@ -7449,17 +7449,17 @@
           </a:ln>
           <a:extLst>
             <a:ext uri="{FAA26D3D-D897-4be2-8F04-BA451C77F1D7}">
-              <ma14:placeholderFlag xmlns:ma14="http://schemas.microsoft.com/office/mac/drawingml/2011/main" xmlns="" val="1"/>
+              <ma14:placeholderFlag xmlns="" xmlns:ma14="http://schemas.microsoft.com/office/mac/drawingml/2011/main" val="1"/>
             </a:ext>
             <a:ext uri="{909E8E84-426E-40dd-AFC4-6F175D3DCCD1}">
-              <a14:hiddenFill xmlns:a14="http://schemas.microsoft.com/office/drawing/2010/main" xmlns="">
+              <a14:hiddenFill xmlns="" xmlns:a14="http://schemas.microsoft.com/office/drawing/2010/main">
                 <a:solidFill>
                   <a:srgbClr val="FFFFFF"/>
                 </a:solidFill>
               </a14:hiddenFill>
             </a:ext>
             <a:ext uri="{91240B29-F687-4f45-9708-019B960494DF}">
-              <a14:hiddenLine xmlns:a14="http://schemas.microsoft.com/office/drawing/2010/main" xmlns="" w="9525">
+              <a14:hiddenLine xmlns="" xmlns:a14="http://schemas.microsoft.com/office/drawing/2010/main" w="9525">
                 <a:solidFill>
                   <a:srgbClr val="000000"/>
                 </a:solidFill>
@@ -7559,7 +7559,7 @@
           <a:p>
             <a:fld id="{A7853F80-D63E-429F-B326-B00475E1D8E8}" type="datetime1">
               <a:rPr lang="en-US" smtClean="0"/>
-              <a:t>1/13/2018</a:t>
+              <a:t>1/14/2018</a:t>
             </a:fld>
             <a:endParaRPr lang="en-US"/>
           </a:p>
@@ -7727,7 +7727,7 @@
           </a:ln>
           <a:extLst>
             <a:ext uri="{909E8E84-426E-40dd-AFC4-6F175D3DCCD1}">
-              <a14:hiddenFill xmlns:a14="http://schemas.microsoft.com/office/drawing/2010/main" xmlns="">
+              <a14:hiddenFill xmlns="" xmlns:a14="http://schemas.microsoft.com/office/drawing/2010/main">
                 <a:solidFill>
                   <a:srgbClr val="FFFFFF"/>
                 </a:solidFill>
@@ -7770,7 +7770,7 @@
           </a:ln>
           <a:extLst>
             <a:ext uri="{909E8E84-426E-40dd-AFC4-6F175D3DCCD1}">
-              <a14:hiddenFill xmlns:a14="http://schemas.microsoft.com/office/drawing/2010/main" xmlns="">
+              <a14:hiddenFill xmlns="" xmlns:a14="http://schemas.microsoft.com/office/drawing/2010/main">
                 <a:noFill/>
               </a14:hiddenFill>
             </a:ext>
@@ -8401,7 +8401,7 @@
           <a:p>
             <a:fld id="{A7853F80-D63E-429F-B326-B00475E1D8E8}" type="datetime1">
               <a:rPr lang="en-US" smtClean="0"/>
-              <a:t>1/13/2018</a:t>
+              <a:t>1/14/2018</a:t>
             </a:fld>
             <a:endParaRPr lang="en-US"/>
           </a:p>
@@ -8870,17 +8870,17 @@
           </a:ln>
           <a:extLst>
             <a:ext uri="{FAA26D3D-D897-4be2-8F04-BA451C77F1D7}">
-              <ma14:placeholderFlag xmlns:ma14="http://schemas.microsoft.com/office/mac/drawingml/2011/main" xmlns="" val="1"/>
+              <ma14:placeholderFlag xmlns="" xmlns:ma14="http://schemas.microsoft.com/office/mac/drawingml/2011/main" val="1"/>
             </a:ext>
             <a:ext uri="{909E8E84-426E-40dd-AFC4-6F175D3DCCD1}">
-              <a14:hiddenFill xmlns:a14="http://schemas.microsoft.com/office/drawing/2010/main" xmlns="">
+              <a14:hiddenFill xmlns="" xmlns:a14="http://schemas.microsoft.com/office/drawing/2010/main">
                 <a:solidFill>
                   <a:srgbClr val="FFFFFF"/>
                 </a:solidFill>
               </a14:hiddenFill>
             </a:ext>
             <a:ext uri="{91240B29-F687-4f45-9708-019B960494DF}">
-              <a14:hiddenLine xmlns:a14="http://schemas.microsoft.com/office/drawing/2010/main" xmlns="" w="9525">
+              <a14:hiddenLine xmlns="" xmlns:a14="http://schemas.microsoft.com/office/drawing/2010/main" w="9525">
                 <a:solidFill>
                   <a:srgbClr val="000000"/>
                 </a:solidFill>
@@ -9785,19 +9785,19 @@
           <a:p>
             <a:r>
               <a:rPr lang="en-US" sz="2800" dirty="0"/>
+              <a:t>Possible as either Bayesian or frequentist</a:t>
+            </a:r>
+          </a:p>
+          <a:p>
+            <a:r>
+              <a:rPr lang="en-US" sz="2800" dirty="0"/>
               <a:t>Fitting requires integration of the random effects</a:t>
             </a:r>
           </a:p>
           <a:p>
             <a:r>
               <a:rPr lang="en-US" sz="2800" dirty="0"/>
-              <a:t>Can be done as either Bayesian or frequentist analysis</a:t>
-            </a:r>
-          </a:p>
-          <a:p>
-            <a:r>
-              <a:rPr lang="en-US" sz="2800" dirty="0"/>
-              <a:t>High-dimensional integration is difficult, so these models historically were not as widely used</a:t>
+              <a:t>High-dimensional integration is difficult, so historically not used</a:t>
             </a:r>
           </a:p>
           <a:p>
@@ -9954,7 +9954,15 @@
           <a:p>
             <a:r>
               <a:rPr lang="en-US" dirty="0"/>
-              <a:t>Uses marginal maximum likelihood inference</a:t>
+              <a:t>Uses </a:t>
+            </a:r>
+            <a:r>
+              <a:rPr lang="en-US" i="1" dirty="0"/>
+              <a:t>marginal maximum likelihood</a:t>
+            </a:r>
+            <a:r>
+              <a:rPr lang="en-US" dirty="0"/>
+              <a:t> inference</a:t>
             </a:r>
           </a:p>
           <a:p>
@@ -12032,13 +12040,19 @@
           <a:p>
             <a:r>
               <a:rPr lang="en-US" dirty="0"/>
-              <a:t>TMB is the best software for fitting them</a:t>
+              <a:t>Requires integration of random effects</a:t>
             </a:r>
           </a:p>
           <a:p>
             <a:r>
               <a:rPr lang="en-US" dirty="0"/>
               <a:t>TMB is integrated with R, but requires writing some C++ code</a:t>
+            </a:r>
+          </a:p>
+          <a:p>
+            <a:r>
+              <a:rPr lang="en-US" dirty="0"/>
+              <a:t>TMB can fit almost all statistical models</a:t>
             </a:r>
           </a:p>
         </p:txBody>

</xml_diff>